<commit_message>
Change the data structure for kernels's polyline
Now it starts from (0, 0). Previously it skipped (0, 0).
</commit_message>
<xml_diff>
--- a/doc/results_20140328/Example Cities.pptx
+++ b/doc/results_20140328/Example Cities.pptx
@@ -3666,9 +3666,45 @@
           <a:chExt cx="0" cy="0"/>
         </a:xfrm>
       </p:grpSpPr>
+      <p:sp>
+        <p:nvSpPr>
+          <p:cNvPr id="3" name="TextBox 2"/>
+          <p:cNvSpPr txBox="1"/>
+          <p:nvPr/>
+        </p:nvSpPr>
+        <p:spPr>
+          <a:xfrm>
+            <a:off x="152400" y="152400"/>
+            <a:ext cx="2374176" cy="646331"/>
+          </a:xfrm>
+          <a:prstGeom prst="rect">
+            <a:avLst/>
+          </a:prstGeom>
+          <a:noFill/>
+        </p:spPr>
+        <p:txBody>
+          <a:bodyPr wrap="none" rtlCol="0">
+            <a:spAutoFit/>
+          </a:bodyPr>
+          <a:lstStyle/>
+          <a:p>
+            <a:r>
+              <a:rPr lang="en-US" dirty="0" smtClean="0"/>
+              <a:t>feature_tel-aviv2.xml</a:t>
+            </a:r>
+            <a:endParaRPr lang="en-US" dirty="0"/>
+          </a:p>
+          <a:p>
+            <a:r>
+              <a:rPr lang="en-US" dirty="0" smtClean="0"/>
+              <a:t>Business &amp; Commercial</a:t>
+            </a:r>
+          </a:p>
+        </p:txBody>
+      </p:sp>
       <p:pic>
         <p:nvPicPr>
-          <p:cNvPr id="9218" name="Picture 2"/>
+          <p:cNvPr id="1026" name="Picture 2"/>
           <p:cNvPicPr>
             <a:picLocks noChangeAspect="1" noChangeArrowheads="1"/>
           </p:cNvPicPr>
@@ -3689,8 +3725,8 @@
         </p:blipFill>
         <p:spPr bwMode="auto">
           <a:xfrm>
-            <a:off x="1624012" y="1066800"/>
-            <a:ext cx="5895975" cy="5686425"/>
+            <a:off x="1310912" y="777015"/>
+            <a:ext cx="6461487" cy="6004785"/>
           </a:xfrm>
           <a:prstGeom prst="rect">
             <a:avLst/>
@@ -3720,42 +3756,6 @@
           </a:extLst>
         </p:spPr>
       </p:pic>
-      <p:sp>
-        <p:nvSpPr>
-          <p:cNvPr id="3" name="TextBox 2"/>
-          <p:cNvSpPr txBox="1"/>
-          <p:nvPr/>
-        </p:nvSpPr>
-        <p:spPr>
-          <a:xfrm>
-            <a:off x="152400" y="152400"/>
-            <a:ext cx="2374176" cy="646331"/>
-          </a:xfrm>
-          <a:prstGeom prst="rect">
-            <a:avLst/>
-          </a:prstGeom>
-          <a:noFill/>
-        </p:spPr>
-        <p:txBody>
-          <a:bodyPr wrap="none" rtlCol="0">
-            <a:spAutoFit/>
-          </a:bodyPr>
-          <a:lstStyle/>
-          <a:p>
-            <a:r>
-              <a:rPr lang="en-US" dirty="0" smtClean="0"/>
-              <a:t>feature_tel-aviv2.xml</a:t>
-            </a:r>
-            <a:endParaRPr lang="en-US" dirty="0"/>
-          </a:p>
-          <a:p>
-            <a:r>
-              <a:rPr lang="en-US" dirty="0" smtClean="0"/>
-              <a:t>Business &amp; Commercial</a:t>
-            </a:r>
-          </a:p>
-        </p:txBody>
-      </p:sp>
     </p:spTree>
     <p:extLst>
       <p:ext uri="{BB962C8B-B14F-4D97-AF65-F5344CB8AC3E}">

</xml_diff>